<commit_message>
Options for RSJY lecturer
</commit_message>
<xml_diff>
--- a/Options.pptx
+++ b/Options.pptx
@@ -5,7 +5,7 @@
     <p:sldMasterId id="2147483648" r:id="rId1"/>
   </p:sldMasterIdLst>
   <p:notesMasterIdLst>
-    <p:notesMasterId r:id="rId21"/>
+    <p:notesMasterId r:id="rId22"/>
   </p:notesMasterIdLst>
   <p:sldIdLst>
     <p:sldId id="256" r:id="rId2"/>
@@ -14,19 +14,20 @@
     <p:sldId id="273" r:id="rId5"/>
     <p:sldId id="274" r:id="rId6"/>
     <p:sldId id="277" r:id="rId7"/>
-    <p:sldId id="284" r:id="rId8"/>
-    <p:sldId id="278" r:id="rId9"/>
-    <p:sldId id="264" r:id="rId10"/>
-    <p:sldId id="263" r:id="rId11"/>
-    <p:sldId id="265" r:id="rId12"/>
-    <p:sldId id="279" r:id="rId13"/>
-    <p:sldId id="280" r:id="rId14"/>
-    <p:sldId id="266" r:id="rId15"/>
-    <p:sldId id="268" r:id="rId16"/>
-    <p:sldId id="267" r:id="rId17"/>
-    <p:sldId id="281" r:id="rId18"/>
-    <p:sldId id="282" r:id="rId19"/>
-    <p:sldId id="283" r:id="rId20"/>
+    <p:sldId id="285" r:id="rId8"/>
+    <p:sldId id="284" r:id="rId9"/>
+    <p:sldId id="278" r:id="rId10"/>
+    <p:sldId id="264" r:id="rId11"/>
+    <p:sldId id="263" r:id="rId12"/>
+    <p:sldId id="265" r:id="rId13"/>
+    <p:sldId id="279" r:id="rId14"/>
+    <p:sldId id="280" r:id="rId15"/>
+    <p:sldId id="266" r:id="rId16"/>
+    <p:sldId id="268" r:id="rId17"/>
+    <p:sldId id="267" r:id="rId18"/>
+    <p:sldId id="281" r:id="rId19"/>
+    <p:sldId id="282" r:id="rId20"/>
+    <p:sldId id="283" r:id="rId21"/>
   </p:sldIdLst>
   <p:sldSz cx="9144000" cy="6858000" type="screen4x3"/>
   <p:notesSz cx="6858000" cy="9144000"/>
@@ -210,7 +211,7 @@
           <a:p>
             <a:fld id="{587B6EBF-2617-4E72-A727-1CDB58C94407}" type="datetimeFigureOut">
               <a:rPr lang="zh-CN" altLang="en-US" smtClean="0"/>
-              <a:t>2016/7/6</a:t>
+              <a:t>2016/7/8</a:t>
             </a:fld>
             <a:endParaRPr lang="zh-CN" altLang="en-US"/>
           </a:p>
@@ -665,7 +666,7 @@
           <a:p>
             <a:fld id="{B14ACE1C-688C-4DE8-9CA3-93FEAB48686A}" type="slidenum">
               <a:rPr lang="zh-CN" altLang="en-US" smtClean="0"/>
-              <a:t>18</a:t>
+              <a:t>19</a:t>
             </a:fld>
             <a:endParaRPr lang="zh-CN" altLang="en-US"/>
           </a:p>
@@ -770,7 +771,7 @@
           <a:p>
             <a:fld id="{B14ACE1C-688C-4DE8-9CA3-93FEAB48686A}" type="slidenum">
               <a:rPr lang="zh-CN" altLang="en-US" smtClean="0"/>
-              <a:t>19</a:t>
+              <a:t>20</a:t>
             </a:fld>
             <a:endParaRPr lang="zh-CN" altLang="en-US"/>
           </a:p>
@@ -970,7 +971,7 @@
           <a:p>
             <a:fld id="{31575651-22B3-44AB-8FFE-53724F2BD2A5}" type="datetimeFigureOut">
               <a:rPr lang="zh-CN" altLang="en-US" smtClean="0"/>
-              <a:t>2016/7/6</a:t>
+              <a:t>2016/7/8</a:t>
             </a:fld>
             <a:endParaRPr lang="zh-CN" altLang="en-US"/>
           </a:p>
@@ -1140,7 +1141,7 @@
           <a:p>
             <a:fld id="{31575651-22B3-44AB-8FFE-53724F2BD2A5}" type="datetimeFigureOut">
               <a:rPr lang="zh-CN" altLang="en-US" smtClean="0"/>
-              <a:t>2016/7/6</a:t>
+              <a:t>2016/7/8</a:t>
             </a:fld>
             <a:endParaRPr lang="zh-CN" altLang="en-US"/>
           </a:p>
@@ -1320,7 +1321,7 @@
           <a:p>
             <a:fld id="{31575651-22B3-44AB-8FFE-53724F2BD2A5}" type="datetimeFigureOut">
               <a:rPr lang="zh-CN" altLang="en-US" smtClean="0"/>
-              <a:t>2016/7/6</a:t>
+              <a:t>2016/7/8</a:t>
             </a:fld>
             <a:endParaRPr lang="zh-CN" altLang="en-US"/>
           </a:p>
@@ -1490,7 +1491,7 @@
           <a:p>
             <a:fld id="{31575651-22B3-44AB-8FFE-53724F2BD2A5}" type="datetimeFigureOut">
               <a:rPr lang="zh-CN" altLang="en-US" smtClean="0"/>
-              <a:t>2016/7/6</a:t>
+              <a:t>2016/7/8</a:t>
             </a:fld>
             <a:endParaRPr lang="zh-CN" altLang="en-US"/>
           </a:p>
@@ -1736,7 +1737,7 @@
           <a:p>
             <a:fld id="{31575651-22B3-44AB-8FFE-53724F2BD2A5}" type="datetimeFigureOut">
               <a:rPr lang="zh-CN" altLang="en-US" smtClean="0"/>
-              <a:t>2016/7/6</a:t>
+              <a:t>2016/7/8</a:t>
             </a:fld>
             <a:endParaRPr lang="zh-CN" altLang="en-US"/>
           </a:p>
@@ -2024,7 +2025,7 @@
           <a:p>
             <a:fld id="{31575651-22B3-44AB-8FFE-53724F2BD2A5}" type="datetimeFigureOut">
               <a:rPr lang="zh-CN" altLang="en-US" smtClean="0"/>
-              <a:t>2016/7/6</a:t>
+              <a:t>2016/7/8</a:t>
             </a:fld>
             <a:endParaRPr lang="zh-CN" altLang="en-US"/>
           </a:p>
@@ -2446,7 +2447,7 @@
           <a:p>
             <a:fld id="{31575651-22B3-44AB-8FFE-53724F2BD2A5}" type="datetimeFigureOut">
               <a:rPr lang="zh-CN" altLang="en-US" smtClean="0"/>
-              <a:t>2016/7/6</a:t>
+              <a:t>2016/7/8</a:t>
             </a:fld>
             <a:endParaRPr lang="zh-CN" altLang="en-US"/>
           </a:p>
@@ -2564,7 +2565,7 @@
           <a:p>
             <a:fld id="{31575651-22B3-44AB-8FFE-53724F2BD2A5}" type="datetimeFigureOut">
               <a:rPr lang="zh-CN" altLang="en-US" smtClean="0"/>
-              <a:t>2016/7/6</a:t>
+              <a:t>2016/7/8</a:t>
             </a:fld>
             <a:endParaRPr lang="zh-CN" altLang="en-US"/>
           </a:p>
@@ -2659,7 +2660,7 @@
           <a:p>
             <a:fld id="{31575651-22B3-44AB-8FFE-53724F2BD2A5}" type="datetimeFigureOut">
               <a:rPr lang="zh-CN" altLang="en-US" smtClean="0"/>
-              <a:t>2016/7/6</a:t>
+              <a:t>2016/7/8</a:t>
             </a:fld>
             <a:endParaRPr lang="zh-CN" altLang="en-US"/>
           </a:p>
@@ -2936,7 +2937,7 @@
           <a:p>
             <a:fld id="{31575651-22B3-44AB-8FFE-53724F2BD2A5}" type="datetimeFigureOut">
               <a:rPr lang="zh-CN" altLang="en-US" smtClean="0"/>
-              <a:t>2016/7/6</a:t>
+              <a:t>2016/7/8</a:t>
             </a:fld>
             <a:endParaRPr lang="zh-CN" altLang="en-US"/>
           </a:p>
@@ -3189,7 +3190,7 @@
           <a:p>
             <a:fld id="{31575651-22B3-44AB-8FFE-53724F2BD2A5}" type="datetimeFigureOut">
               <a:rPr lang="zh-CN" altLang="en-US" smtClean="0"/>
-              <a:t>2016/7/6</a:t>
+              <a:t>2016/7/8</a:t>
             </a:fld>
             <a:endParaRPr lang="zh-CN" altLang="en-US"/>
           </a:p>
@@ -3402,7 +3403,7 @@
           <a:p>
             <a:fld id="{31575651-22B3-44AB-8FFE-53724F2BD2A5}" type="datetimeFigureOut">
               <a:rPr lang="zh-CN" altLang="en-US" smtClean="0"/>
-              <a:t>2016/7/6</a:t>
+              <a:t>2016/7/8</a:t>
             </a:fld>
             <a:endParaRPr lang="zh-CN" altLang="en-US"/>
           </a:p>
@@ -3858,6 +3859,241 @@
       </p:grpSpPr>
       <p:sp>
         <p:nvSpPr>
+          <p:cNvPr id="2" name="标题 1"/>
+          <p:cNvSpPr>
+            <a:spLocks noGrp="1"/>
+          </p:cNvSpPr>
+          <p:nvPr>
+            <p:ph type="title"/>
+          </p:nvPr>
+        </p:nvSpPr>
+        <p:spPr/>
+        <p:txBody>
+          <a:bodyPr>
+            <a:normAutofit/>
+          </a:bodyPr>
+          <a:lstStyle/>
+          <a:p>
+            <a:pPr algn="l"/>
+            <a:r>
+              <a:rPr lang="en-US" altLang="zh-CN" dirty="0"/>
+              <a:t>Lower &amp; Upper Bound of </a:t>
+            </a:r>
+            <a:r>
+              <a:rPr lang="en-US" altLang="zh-CN" dirty="0" smtClean="0"/>
+              <a:t>Option(2)</a:t>
+            </a:r>
+            <a:endParaRPr lang="en-US" altLang="zh-CN" dirty="0"/>
+          </a:p>
+        </p:txBody>
+      </p:sp>
+      <p:sp>
+        <p:nvSpPr>
+          <p:cNvPr id="3" name="内容占位符 2"/>
+          <p:cNvSpPr>
+            <a:spLocks noGrp="1"/>
+          </p:cNvSpPr>
+          <p:nvPr>
+            <p:ph idx="1"/>
+          </p:nvPr>
+        </p:nvSpPr>
+        <p:spPr>
+          <a:xfrm>
+            <a:off x="95511" y="1474114"/>
+            <a:ext cx="8664946" cy="5267254"/>
+          </a:xfrm>
+        </p:spPr>
+        <p:txBody>
+          <a:bodyPr>
+            <a:normAutofit/>
+          </a:bodyPr>
+          <a:lstStyle/>
+          <a:p>
+            <a:pPr>
+              <a:buFont typeface="Wingdings" panose="05000000000000000000" pitchFamily="2" charset="2"/>
+              <a:buChar char="Ø"/>
+            </a:pPr>
+            <a:r>
+              <a:rPr lang="en-US" altLang="zh-CN" sz="2400" dirty="0" smtClean="0"/>
+              <a:t>Lower &amp; Upper Bound of Option Value</a:t>
+            </a:r>
+          </a:p>
+          <a:p>
+            <a:pPr>
+              <a:buFont typeface="Wingdings" panose="05000000000000000000" pitchFamily="2" charset="2"/>
+              <a:buChar char="Ø"/>
+            </a:pPr>
+            <a:endParaRPr lang="zh-CN" altLang="en-US" sz="2400" dirty="0"/>
+          </a:p>
+        </p:txBody>
+      </p:sp>
+      <p:pic>
+        <p:nvPicPr>
+          <p:cNvPr id="1026" name="Picture 2"/>
+          <p:cNvPicPr>
+            <a:picLocks noChangeAspect="1" noChangeArrowheads="1"/>
+          </p:cNvPicPr>
+          <p:nvPr/>
+        </p:nvPicPr>
+        <p:blipFill>
+          <a:blip r:embed="rId2">
+            <a:extLst>
+              <a:ext uri="{28A0092B-C50C-407E-A947-70E740481C1C}">
+                <a14:useLocalDpi xmlns:a14="http://schemas.microsoft.com/office/drawing/2010/main" val="0"/>
+              </a:ext>
+            </a:extLst>
+          </a:blip>
+          <a:srcRect/>
+          <a:stretch>
+            <a:fillRect/>
+          </a:stretch>
+        </p:blipFill>
+        <p:spPr bwMode="auto">
+          <a:xfrm>
+            <a:off x="395536" y="1160893"/>
+            <a:ext cx="8064896" cy="323891"/>
+          </a:xfrm>
+          <a:prstGeom prst="rect">
+            <a:avLst/>
+          </a:prstGeom>
+          <a:noFill/>
+          <a:ln>
+            <a:noFill/>
+          </a:ln>
+          <a:effectLst/>
+          <a:extLst>
+            <a:ext uri="{909E8E84-426E-40DD-AFC4-6F175D3DCCD1}">
+              <a14:hiddenFill xmlns:a14="http://schemas.microsoft.com/office/drawing/2010/main">
+                <a:solidFill>
+                  <a:schemeClr val="accent1"/>
+                </a:solidFill>
+              </a14:hiddenFill>
+            </a:ext>
+            <a:ext uri="{91240B29-F687-4F45-9708-019B960494DF}">
+              <a14:hiddenLine xmlns:a14="http://schemas.microsoft.com/office/drawing/2010/main" w="9525">
+                <a:solidFill>
+                  <a:schemeClr val="tx1"/>
+                </a:solidFill>
+                <a:miter lim="800000"/>
+                <a:headEnd/>
+                <a:tailEnd/>
+              </a14:hiddenLine>
+            </a:ext>
+            <a:ext uri="{AF507438-7753-43E0-B8FC-AC1667EBCBE1}">
+              <a14:hiddenEffects xmlns:a14="http://schemas.microsoft.com/office/drawing/2010/main">
+                <a:effectLst>
+                  <a:outerShdw dist="35921" dir="2700000" algn="ctr" rotWithShape="0">
+                    <a:schemeClr val="bg2"/>
+                  </a:outerShdw>
+                </a:effectLst>
+              </a14:hiddenEffects>
+            </a:ext>
+          </a:extLst>
+        </p:spPr>
+      </p:pic>
+      <p:pic>
+        <p:nvPicPr>
+          <p:cNvPr id="8" name="Picture 2"/>
+          <p:cNvPicPr>
+            <a:picLocks noChangeAspect="1" noChangeArrowheads="1"/>
+          </p:cNvPicPr>
+          <p:nvPr/>
+        </p:nvPicPr>
+        <p:blipFill>
+          <a:blip r:embed="rId3">
+            <a:extLst>
+              <a:ext uri="{28A0092B-C50C-407E-A947-70E740481C1C}">
+                <a14:useLocalDpi xmlns:a14="http://schemas.microsoft.com/office/drawing/2010/main" val="0"/>
+              </a:ext>
+            </a:extLst>
+          </a:blip>
+          <a:srcRect/>
+          <a:stretch>
+            <a:fillRect/>
+          </a:stretch>
+        </p:blipFill>
+        <p:spPr bwMode="auto">
+          <a:xfrm>
+            <a:off x="464473" y="2708920"/>
+            <a:ext cx="7995959" cy="2376264"/>
+          </a:xfrm>
+          <a:prstGeom prst="rect">
+            <a:avLst/>
+          </a:prstGeom>
+          <a:noFill/>
+          <a:ln>
+            <a:noFill/>
+          </a:ln>
+          <a:effectLst/>
+          <a:extLst>
+            <a:ext uri="{909E8E84-426E-40DD-AFC4-6F175D3DCCD1}">
+              <a14:hiddenFill xmlns:a14="http://schemas.microsoft.com/office/drawing/2010/main">
+                <a:solidFill>
+                  <a:schemeClr val="accent1"/>
+                </a:solidFill>
+              </a14:hiddenFill>
+            </a:ext>
+            <a:ext uri="{91240B29-F687-4F45-9708-019B960494DF}">
+              <a14:hiddenLine xmlns:a14="http://schemas.microsoft.com/office/drawing/2010/main" w="9525">
+                <a:solidFill>
+                  <a:schemeClr val="tx1"/>
+                </a:solidFill>
+                <a:miter lim="800000"/>
+                <a:headEnd/>
+                <a:tailEnd/>
+              </a14:hiddenLine>
+            </a:ext>
+            <a:ext uri="{AF507438-7753-43E0-B8FC-AC1667EBCBE1}">
+              <a14:hiddenEffects xmlns:a14="http://schemas.microsoft.com/office/drawing/2010/main">
+                <a:effectLst>
+                  <a:outerShdw dist="35921" dir="2700000" algn="ctr" rotWithShape="0">
+                    <a:schemeClr val="bg2"/>
+                  </a:outerShdw>
+                </a:effectLst>
+              </a14:hiddenEffects>
+            </a:ext>
+          </a:extLst>
+        </p:spPr>
+      </p:pic>
+    </p:spTree>
+    <p:extLst>
+      <p:ext uri="{BB962C8B-B14F-4D97-AF65-F5344CB8AC3E}">
+        <p14:creationId xmlns:p14="http://schemas.microsoft.com/office/powerpoint/2010/main" val="4095114587"/>
+      </p:ext>
+    </p:extLst>
+  </p:cSld>
+  <p:clrMapOvr>
+    <a:masterClrMapping/>
+  </p:clrMapOvr>
+  <p:timing>
+    <p:tnLst>
+      <p:par>
+        <p:cTn id="1" dur="indefinite" restart="never" nodeType="tmRoot"/>
+      </p:par>
+    </p:tnLst>
+  </p:timing>
+</p:sld>
+</file>
+
+<file path=ppt/slides/slide11.xml><?xml version="1.0" encoding="utf-8"?>
+<p:sld xmlns:a="http://schemas.openxmlformats.org/drawingml/2006/main" xmlns:r="http://schemas.openxmlformats.org/officeDocument/2006/relationships" xmlns:p="http://schemas.openxmlformats.org/presentationml/2006/main">
+  <p:cSld>
+    <p:spTree>
+      <p:nvGrpSpPr>
+        <p:cNvPr id="1" name=""/>
+        <p:cNvGrpSpPr/>
+        <p:nvPr/>
+      </p:nvGrpSpPr>
+      <p:grpSpPr>
+        <a:xfrm>
+          <a:off x="0" y="0"/>
+          <a:ext cx="0" cy="0"/>
+          <a:chOff x="0" y="0"/>
+          <a:chExt cx="0" cy="0"/>
+        </a:xfrm>
+      </p:grpSpPr>
+      <p:sp>
+        <p:nvSpPr>
           <p:cNvPr id="4" name="矩形 3"/>
           <p:cNvSpPr/>
           <p:nvPr/>
@@ -4071,7 +4307,7 @@
 </p:sld>
 </file>
 
-<file path=ppt/slides/slide11.xml><?xml version="1.0" encoding="utf-8"?>
+<file path=ppt/slides/slide12.xml><?xml version="1.0" encoding="utf-8"?>
 <p:sld xmlns:a="http://schemas.openxmlformats.org/drawingml/2006/main" xmlns:r="http://schemas.openxmlformats.org/officeDocument/2006/relationships" xmlns:p="http://schemas.openxmlformats.org/presentationml/2006/main">
   <p:cSld>
     <p:spTree>
@@ -4328,7 +4564,7 @@
 </p:sld>
 </file>
 
-<file path=ppt/slides/slide12.xml><?xml version="1.0" encoding="utf-8"?>
+<file path=ppt/slides/slide13.xml><?xml version="1.0" encoding="utf-8"?>
 <p:sld xmlns:a="http://schemas.openxmlformats.org/drawingml/2006/main" xmlns:r="http://schemas.openxmlformats.org/officeDocument/2006/relationships" xmlns:p="http://schemas.openxmlformats.org/presentationml/2006/main">
   <p:cSld>
     <p:spTree>
@@ -4583,7 +4819,7 @@
 </p:sld>
 </file>
 
-<file path=ppt/slides/slide13.xml><?xml version="1.0" encoding="utf-8"?>
+<file path=ppt/slides/slide14.xml><?xml version="1.0" encoding="utf-8"?>
 <p:sld xmlns:a="http://schemas.openxmlformats.org/drawingml/2006/main" xmlns:r="http://schemas.openxmlformats.org/officeDocument/2006/relationships" xmlns:p="http://schemas.openxmlformats.org/presentationml/2006/main">
   <p:cSld>
     <p:spTree>
@@ -4836,7 +5072,7 @@
 </p:sld>
 </file>
 
-<file path=ppt/slides/slide14.xml><?xml version="1.0" encoding="utf-8"?>
+<file path=ppt/slides/slide15.xml><?xml version="1.0" encoding="utf-8"?>
 <p:sld xmlns:a="http://schemas.openxmlformats.org/drawingml/2006/main" xmlns:r="http://schemas.openxmlformats.org/officeDocument/2006/relationships" xmlns:p="http://schemas.openxmlformats.org/presentationml/2006/main">
   <p:cSld>
     <p:spTree>
@@ -5102,7 +5338,7 @@
 </p:sld>
 </file>
 
-<file path=ppt/slides/slide15.xml><?xml version="1.0" encoding="utf-8"?>
+<file path=ppt/slides/slide16.xml><?xml version="1.0" encoding="utf-8"?>
 <p:sld xmlns:a="http://schemas.openxmlformats.org/drawingml/2006/main" xmlns:r="http://schemas.openxmlformats.org/officeDocument/2006/relationships" xmlns:p="http://schemas.openxmlformats.org/presentationml/2006/main">
   <p:cSld>
     <p:spTree>
@@ -5514,7 +5750,7 @@
 </p:sld>
 </file>
 
-<file path=ppt/slides/slide16.xml><?xml version="1.0" encoding="utf-8"?>
+<file path=ppt/slides/slide17.xml><?xml version="1.0" encoding="utf-8"?>
 <p:sld xmlns:a="http://schemas.openxmlformats.org/drawingml/2006/main" xmlns:r="http://schemas.openxmlformats.org/officeDocument/2006/relationships" xmlns:p="http://schemas.openxmlformats.org/presentationml/2006/main">
   <p:cSld>
     <p:spTree>
@@ -5750,7 +5986,7 @@
 </p:sld>
 </file>
 
-<file path=ppt/slides/slide17.xml><?xml version="1.0" encoding="utf-8"?>
+<file path=ppt/slides/slide18.xml><?xml version="1.0" encoding="utf-8"?>
 <p:sld xmlns:a="http://schemas.openxmlformats.org/drawingml/2006/main" xmlns:r="http://schemas.openxmlformats.org/officeDocument/2006/relationships" xmlns:p="http://schemas.openxmlformats.org/presentationml/2006/main">
   <p:cSld>
     <p:spTree>
@@ -5939,7 +6175,7 @@
 </p:sld>
 </file>
 
-<file path=ppt/slides/slide18.xml><?xml version="1.0" encoding="utf-8"?>
+<file path=ppt/slides/slide19.xml><?xml version="1.0" encoding="utf-8"?>
 <p:sld xmlns:a="http://schemas.openxmlformats.org/drawingml/2006/main" xmlns:r="http://schemas.openxmlformats.org/officeDocument/2006/relationships" xmlns:p="http://schemas.openxmlformats.org/presentationml/2006/main">
   <p:cSld>
     <p:spTree>
@@ -6202,7 +6438,200 @@
 </p:sld>
 </file>
 
-<file path=ppt/slides/slide19.xml><?xml version="1.0" encoding="utf-8"?>
+<file path=ppt/slides/slide2.xml><?xml version="1.0" encoding="utf-8"?>
+<p:sld xmlns:a="http://schemas.openxmlformats.org/drawingml/2006/main" xmlns:r="http://schemas.openxmlformats.org/officeDocument/2006/relationships" xmlns:p="http://schemas.openxmlformats.org/presentationml/2006/main">
+  <p:cSld>
+    <p:spTree>
+      <p:nvGrpSpPr>
+        <p:cNvPr id="1" name=""/>
+        <p:cNvGrpSpPr/>
+        <p:nvPr/>
+      </p:nvGrpSpPr>
+      <p:grpSpPr>
+        <a:xfrm>
+          <a:off x="0" y="0"/>
+          <a:ext cx="0" cy="0"/>
+          <a:chOff x="0" y="0"/>
+          <a:chExt cx="0" cy="0"/>
+        </a:xfrm>
+      </p:grpSpPr>
+      <p:sp>
+        <p:nvSpPr>
+          <p:cNvPr id="2" name="标题 1"/>
+          <p:cNvSpPr>
+            <a:spLocks noGrp="1"/>
+          </p:cNvSpPr>
+          <p:nvPr>
+            <p:ph type="title"/>
+          </p:nvPr>
+        </p:nvSpPr>
+        <p:spPr/>
+        <p:txBody>
+          <a:bodyPr/>
+          <a:lstStyle/>
+          <a:p>
+            <a:pPr algn="l"/>
+            <a:r>
+              <a:rPr lang="en-US" altLang="zh-CN" dirty="0" err="1" smtClean="0"/>
+              <a:t>MindMap</a:t>
+            </a:r>
+            <a:r>
+              <a:rPr lang="en-US" altLang="zh-CN" dirty="0" smtClean="0"/>
+              <a:t> </a:t>
+            </a:r>
+            <a:endParaRPr lang="zh-CN" altLang="en-US" dirty="0"/>
+          </a:p>
+        </p:txBody>
+      </p:sp>
+      <p:pic>
+        <p:nvPicPr>
+          <p:cNvPr id="1026" name="Picture 2"/>
+          <p:cNvPicPr>
+            <a:picLocks noChangeAspect="1" noChangeArrowheads="1"/>
+          </p:cNvPicPr>
+          <p:nvPr/>
+        </p:nvPicPr>
+        <p:blipFill>
+          <a:blip r:embed="rId2">
+            <a:extLst>
+              <a:ext uri="{28A0092B-C50C-407E-A947-70E740481C1C}">
+                <a14:useLocalDpi xmlns:a14="http://schemas.microsoft.com/office/drawing/2010/main" val="0"/>
+              </a:ext>
+            </a:extLst>
+          </a:blip>
+          <a:srcRect/>
+          <a:stretch>
+            <a:fillRect/>
+          </a:stretch>
+        </p:blipFill>
+        <p:spPr bwMode="auto">
+          <a:xfrm>
+            <a:off x="395536" y="1160893"/>
+            <a:ext cx="8064896" cy="323891"/>
+          </a:xfrm>
+          <a:prstGeom prst="rect">
+            <a:avLst/>
+          </a:prstGeom>
+          <a:noFill/>
+          <a:ln>
+            <a:noFill/>
+          </a:ln>
+          <a:effectLst/>
+          <a:extLst>
+            <a:ext uri="{909E8E84-426E-40DD-AFC4-6F175D3DCCD1}">
+              <a14:hiddenFill xmlns:a14="http://schemas.microsoft.com/office/drawing/2010/main">
+                <a:solidFill>
+                  <a:schemeClr val="accent1"/>
+                </a:solidFill>
+              </a14:hiddenFill>
+            </a:ext>
+            <a:ext uri="{91240B29-F687-4F45-9708-019B960494DF}">
+              <a14:hiddenLine xmlns:a14="http://schemas.microsoft.com/office/drawing/2010/main" w="9525">
+                <a:solidFill>
+                  <a:schemeClr val="tx1"/>
+                </a:solidFill>
+                <a:miter lim="800000"/>
+                <a:headEnd/>
+                <a:tailEnd/>
+              </a14:hiddenLine>
+            </a:ext>
+            <a:ext uri="{AF507438-7753-43E0-B8FC-AC1667EBCBE1}">
+              <a14:hiddenEffects xmlns:a14="http://schemas.microsoft.com/office/drawing/2010/main">
+                <a:effectLst>
+                  <a:outerShdw dist="35921" dir="2700000" algn="ctr" rotWithShape="0">
+                    <a:schemeClr val="bg2"/>
+                  </a:outerShdw>
+                </a:effectLst>
+              </a14:hiddenEffects>
+            </a:ext>
+          </a:extLst>
+        </p:spPr>
+      </p:pic>
+      <p:pic>
+        <p:nvPicPr>
+          <p:cNvPr id="2050" name="Picture 2"/>
+          <p:cNvPicPr>
+            <a:picLocks noChangeAspect="1" noChangeArrowheads="1"/>
+          </p:cNvPicPr>
+          <p:nvPr/>
+        </p:nvPicPr>
+        <p:blipFill>
+          <a:blip r:embed="rId3">
+            <a:extLst>
+              <a:ext uri="{28A0092B-C50C-407E-A947-70E740481C1C}">
+                <a14:useLocalDpi xmlns:a14="http://schemas.microsoft.com/office/drawing/2010/main" val="0"/>
+              </a:ext>
+            </a:extLst>
+          </a:blip>
+          <a:srcRect/>
+          <a:stretch>
+            <a:fillRect/>
+          </a:stretch>
+        </p:blipFill>
+        <p:spPr bwMode="auto">
+          <a:xfrm>
+            <a:off x="-14519" y="2040974"/>
+            <a:ext cx="9217024" cy="3100921"/>
+          </a:xfrm>
+          <a:prstGeom prst="rect">
+            <a:avLst/>
+          </a:prstGeom>
+          <a:noFill/>
+          <a:ln>
+            <a:noFill/>
+          </a:ln>
+          <a:effectLst/>
+          <a:extLst>
+            <a:ext uri="{909E8E84-426E-40DD-AFC4-6F175D3DCCD1}">
+              <a14:hiddenFill xmlns:a14="http://schemas.microsoft.com/office/drawing/2010/main">
+                <a:solidFill>
+                  <a:schemeClr val="accent1"/>
+                </a:solidFill>
+              </a14:hiddenFill>
+            </a:ext>
+            <a:ext uri="{91240B29-F687-4F45-9708-019B960494DF}">
+              <a14:hiddenLine xmlns:a14="http://schemas.microsoft.com/office/drawing/2010/main" w="9525">
+                <a:solidFill>
+                  <a:schemeClr val="tx1"/>
+                </a:solidFill>
+                <a:miter lim="800000"/>
+                <a:headEnd/>
+                <a:tailEnd/>
+              </a14:hiddenLine>
+            </a:ext>
+            <a:ext uri="{AF507438-7753-43E0-B8FC-AC1667EBCBE1}">
+              <a14:hiddenEffects xmlns:a14="http://schemas.microsoft.com/office/drawing/2010/main">
+                <a:effectLst>
+                  <a:outerShdw dist="35921" dir="2700000" algn="ctr" rotWithShape="0">
+                    <a:schemeClr val="bg2"/>
+                  </a:outerShdw>
+                </a:effectLst>
+              </a14:hiddenEffects>
+            </a:ext>
+          </a:extLst>
+        </p:spPr>
+      </p:pic>
+    </p:spTree>
+    <p:extLst>
+      <p:ext uri="{BB962C8B-B14F-4D97-AF65-F5344CB8AC3E}">
+        <p14:creationId xmlns:p14="http://schemas.microsoft.com/office/powerpoint/2010/main" val="2692018564"/>
+      </p:ext>
+    </p:extLst>
+  </p:cSld>
+  <p:clrMapOvr>
+    <a:masterClrMapping/>
+  </p:clrMapOvr>
+  <p:timing>
+    <p:tnLst>
+      <p:par>
+        <p:cTn id="1" dur="indefinite" restart="never" nodeType="tmRoot"/>
+      </p:par>
+    </p:tnLst>
+  </p:timing>
+</p:sld>
+</file>
+
+<file path=ppt/slides/slide20.xml><?xml version="1.0" encoding="utf-8"?>
 <p:sld xmlns:a="http://schemas.openxmlformats.org/drawingml/2006/main" xmlns:r="http://schemas.openxmlformats.org/officeDocument/2006/relationships" xmlns:p="http://schemas.openxmlformats.org/presentationml/2006/main">
   <p:cSld>
     <p:spTree>
@@ -6541,199 +6970,6 @@
 </p:sld>
 </file>
 
-<file path=ppt/slides/slide2.xml><?xml version="1.0" encoding="utf-8"?>
-<p:sld xmlns:a="http://schemas.openxmlformats.org/drawingml/2006/main" xmlns:r="http://schemas.openxmlformats.org/officeDocument/2006/relationships" xmlns:p="http://schemas.openxmlformats.org/presentationml/2006/main">
-  <p:cSld>
-    <p:spTree>
-      <p:nvGrpSpPr>
-        <p:cNvPr id="1" name=""/>
-        <p:cNvGrpSpPr/>
-        <p:nvPr/>
-      </p:nvGrpSpPr>
-      <p:grpSpPr>
-        <a:xfrm>
-          <a:off x="0" y="0"/>
-          <a:ext cx="0" cy="0"/>
-          <a:chOff x="0" y="0"/>
-          <a:chExt cx="0" cy="0"/>
-        </a:xfrm>
-      </p:grpSpPr>
-      <p:sp>
-        <p:nvSpPr>
-          <p:cNvPr id="2" name="标题 1"/>
-          <p:cNvSpPr>
-            <a:spLocks noGrp="1"/>
-          </p:cNvSpPr>
-          <p:nvPr>
-            <p:ph type="title"/>
-          </p:nvPr>
-        </p:nvSpPr>
-        <p:spPr/>
-        <p:txBody>
-          <a:bodyPr/>
-          <a:lstStyle/>
-          <a:p>
-            <a:pPr algn="l"/>
-            <a:r>
-              <a:rPr lang="en-US" altLang="zh-CN" dirty="0" err="1" smtClean="0"/>
-              <a:t>MindMap</a:t>
-            </a:r>
-            <a:r>
-              <a:rPr lang="en-US" altLang="zh-CN" dirty="0" smtClean="0"/>
-              <a:t> </a:t>
-            </a:r>
-            <a:endParaRPr lang="zh-CN" altLang="en-US" dirty="0"/>
-          </a:p>
-        </p:txBody>
-      </p:sp>
-      <p:pic>
-        <p:nvPicPr>
-          <p:cNvPr id="1026" name="Picture 2"/>
-          <p:cNvPicPr>
-            <a:picLocks noChangeAspect="1" noChangeArrowheads="1"/>
-          </p:cNvPicPr>
-          <p:nvPr/>
-        </p:nvPicPr>
-        <p:blipFill>
-          <a:blip r:embed="rId2">
-            <a:extLst>
-              <a:ext uri="{28A0092B-C50C-407E-A947-70E740481C1C}">
-                <a14:useLocalDpi xmlns:a14="http://schemas.microsoft.com/office/drawing/2010/main" val="0"/>
-              </a:ext>
-            </a:extLst>
-          </a:blip>
-          <a:srcRect/>
-          <a:stretch>
-            <a:fillRect/>
-          </a:stretch>
-        </p:blipFill>
-        <p:spPr bwMode="auto">
-          <a:xfrm>
-            <a:off x="395536" y="1160893"/>
-            <a:ext cx="8064896" cy="323891"/>
-          </a:xfrm>
-          <a:prstGeom prst="rect">
-            <a:avLst/>
-          </a:prstGeom>
-          <a:noFill/>
-          <a:ln>
-            <a:noFill/>
-          </a:ln>
-          <a:effectLst/>
-          <a:extLst>
-            <a:ext uri="{909E8E84-426E-40DD-AFC4-6F175D3DCCD1}">
-              <a14:hiddenFill xmlns:a14="http://schemas.microsoft.com/office/drawing/2010/main">
-                <a:solidFill>
-                  <a:schemeClr val="accent1"/>
-                </a:solidFill>
-              </a14:hiddenFill>
-            </a:ext>
-            <a:ext uri="{91240B29-F687-4F45-9708-019B960494DF}">
-              <a14:hiddenLine xmlns:a14="http://schemas.microsoft.com/office/drawing/2010/main" w="9525">
-                <a:solidFill>
-                  <a:schemeClr val="tx1"/>
-                </a:solidFill>
-                <a:miter lim="800000"/>
-                <a:headEnd/>
-                <a:tailEnd/>
-              </a14:hiddenLine>
-            </a:ext>
-            <a:ext uri="{AF507438-7753-43E0-B8FC-AC1667EBCBE1}">
-              <a14:hiddenEffects xmlns:a14="http://schemas.microsoft.com/office/drawing/2010/main">
-                <a:effectLst>
-                  <a:outerShdw dist="35921" dir="2700000" algn="ctr" rotWithShape="0">
-                    <a:schemeClr val="bg2"/>
-                  </a:outerShdw>
-                </a:effectLst>
-              </a14:hiddenEffects>
-            </a:ext>
-          </a:extLst>
-        </p:spPr>
-      </p:pic>
-      <p:pic>
-        <p:nvPicPr>
-          <p:cNvPr id="2050" name="Picture 2"/>
-          <p:cNvPicPr>
-            <a:picLocks noChangeAspect="1" noChangeArrowheads="1"/>
-          </p:cNvPicPr>
-          <p:nvPr/>
-        </p:nvPicPr>
-        <p:blipFill>
-          <a:blip r:embed="rId3">
-            <a:extLst>
-              <a:ext uri="{28A0092B-C50C-407E-A947-70E740481C1C}">
-                <a14:useLocalDpi xmlns:a14="http://schemas.microsoft.com/office/drawing/2010/main" val="0"/>
-              </a:ext>
-            </a:extLst>
-          </a:blip>
-          <a:srcRect/>
-          <a:stretch>
-            <a:fillRect/>
-          </a:stretch>
-        </p:blipFill>
-        <p:spPr bwMode="auto">
-          <a:xfrm>
-            <a:off x="-14519" y="2040974"/>
-            <a:ext cx="9217024" cy="3100921"/>
-          </a:xfrm>
-          <a:prstGeom prst="rect">
-            <a:avLst/>
-          </a:prstGeom>
-          <a:noFill/>
-          <a:ln>
-            <a:noFill/>
-          </a:ln>
-          <a:effectLst/>
-          <a:extLst>
-            <a:ext uri="{909E8E84-426E-40DD-AFC4-6F175D3DCCD1}">
-              <a14:hiddenFill xmlns:a14="http://schemas.microsoft.com/office/drawing/2010/main">
-                <a:solidFill>
-                  <a:schemeClr val="accent1"/>
-                </a:solidFill>
-              </a14:hiddenFill>
-            </a:ext>
-            <a:ext uri="{91240B29-F687-4F45-9708-019B960494DF}">
-              <a14:hiddenLine xmlns:a14="http://schemas.microsoft.com/office/drawing/2010/main" w="9525">
-                <a:solidFill>
-                  <a:schemeClr val="tx1"/>
-                </a:solidFill>
-                <a:miter lim="800000"/>
-                <a:headEnd/>
-                <a:tailEnd/>
-              </a14:hiddenLine>
-            </a:ext>
-            <a:ext uri="{AF507438-7753-43E0-B8FC-AC1667EBCBE1}">
-              <a14:hiddenEffects xmlns:a14="http://schemas.microsoft.com/office/drawing/2010/main">
-                <a:effectLst>
-                  <a:outerShdw dist="35921" dir="2700000" algn="ctr" rotWithShape="0">
-                    <a:schemeClr val="bg2"/>
-                  </a:outerShdw>
-                </a:effectLst>
-              </a14:hiddenEffects>
-            </a:ext>
-          </a:extLst>
-        </p:spPr>
-      </p:pic>
-    </p:spTree>
-    <p:extLst>
-      <p:ext uri="{BB962C8B-B14F-4D97-AF65-F5344CB8AC3E}">
-        <p14:creationId xmlns:p14="http://schemas.microsoft.com/office/powerpoint/2010/main" val="2692018564"/>
-      </p:ext>
-    </p:extLst>
-  </p:cSld>
-  <p:clrMapOvr>
-    <a:masterClrMapping/>
-  </p:clrMapOvr>
-  <p:timing>
-    <p:tnLst>
-      <p:par>
-        <p:cTn id="1" dur="indefinite" restart="never" nodeType="tmRoot"/>
-      </p:par>
-    </p:tnLst>
-  </p:timing>
-</p:sld>
-</file>
-
 <file path=ppt/slides/slide3.xml><?xml version="1.0" encoding="utf-8"?>
 <p:sld xmlns:a="http://schemas.openxmlformats.org/drawingml/2006/main" xmlns:r="http://schemas.openxmlformats.org/officeDocument/2006/relationships" xmlns:p="http://schemas.openxmlformats.org/presentationml/2006/main">
   <p:cSld>
@@ -8047,6 +8283,570 @@
             <a:pPr algn="l"/>
             <a:r>
               <a:rPr lang="en-US" altLang="zh-CN" dirty="0" smtClean="0"/>
+              <a:t>Factors – </a:t>
+            </a:r>
+            <a:r>
+              <a:rPr lang="en-US" altLang="zh-CN" dirty="0" smtClean="0"/>
+              <a:t>Risk Free Rate</a:t>
+            </a:r>
+            <a:r>
+              <a:rPr lang="en-US" altLang="zh-CN" dirty="0" smtClean="0"/>
+              <a:t>	</a:t>
+            </a:r>
+            <a:endParaRPr lang="zh-CN" altLang="en-US" dirty="0"/>
+          </a:p>
+        </p:txBody>
+      </p:sp>
+      <p:pic>
+        <p:nvPicPr>
+          <p:cNvPr id="1026" name="Picture 2"/>
+          <p:cNvPicPr>
+            <a:picLocks noChangeAspect="1" noChangeArrowheads="1"/>
+          </p:cNvPicPr>
+          <p:nvPr/>
+        </p:nvPicPr>
+        <p:blipFill>
+          <a:blip r:embed="rId2">
+            <a:extLst>
+              <a:ext uri="{28A0092B-C50C-407E-A947-70E740481C1C}">
+                <a14:useLocalDpi xmlns:a14="http://schemas.microsoft.com/office/drawing/2010/main" val="0"/>
+              </a:ext>
+            </a:extLst>
+          </a:blip>
+          <a:srcRect/>
+          <a:stretch>
+            <a:fillRect/>
+          </a:stretch>
+        </p:blipFill>
+        <p:spPr bwMode="auto">
+          <a:xfrm>
+            <a:off x="395536" y="1160893"/>
+            <a:ext cx="8064896" cy="323891"/>
+          </a:xfrm>
+          <a:prstGeom prst="rect">
+            <a:avLst/>
+          </a:prstGeom>
+          <a:noFill/>
+          <a:ln>
+            <a:noFill/>
+          </a:ln>
+          <a:effectLst/>
+          <a:extLst>
+            <a:ext uri="{909E8E84-426E-40DD-AFC4-6F175D3DCCD1}">
+              <a14:hiddenFill xmlns:a14="http://schemas.microsoft.com/office/drawing/2010/main">
+                <a:solidFill>
+                  <a:schemeClr val="accent1"/>
+                </a:solidFill>
+              </a14:hiddenFill>
+            </a:ext>
+            <a:ext uri="{91240B29-F687-4F45-9708-019B960494DF}">
+              <a14:hiddenLine xmlns:a14="http://schemas.microsoft.com/office/drawing/2010/main" w="9525">
+                <a:solidFill>
+                  <a:schemeClr val="tx1"/>
+                </a:solidFill>
+                <a:miter lim="800000"/>
+                <a:headEnd/>
+                <a:tailEnd/>
+              </a14:hiddenLine>
+            </a:ext>
+            <a:ext uri="{AF507438-7753-43E0-B8FC-AC1667EBCBE1}">
+              <a14:hiddenEffects xmlns:a14="http://schemas.microsoft.com/office/drawing/2010/main">
+                <a:effectLst>
+                  <a:outerShdw dist="35921" dir="2700000" algn="ctr" rotWithShape="0">
+                    <a:schemeClr val="bg2"/>
+                  </a:outerShdw>
+                </a:effectLst>
+              </a14:hiddenEffects>
+            </a:ext>
+          </a:extLst>
+        </p:spPr>
+      </p:pic>
+      <p:sp>
+        <p:nvSpPr>
+          <p:cNvPr id="13" name="内容占位符 2"/>
+          <p:cNvSpPr>
+            <a:spLocks noGrp="1"/>
+          </p:cNvSpPr>
+          <p:nvPr>
+            <p:ph idx="1"/>
+          </p:nvPr>
+        </p:nvSpPr>
+        <p:spPr>
+          <a:xfrm>
+            <a:off x="374346" y="1510850"/>
+            <a:ext cx="8086086" cy="4294414"/>
+          </a:xfrm>
+        </p:spPr>
+        <p:txBody>
+          <a:bodyPr>
+            <a:normAutofit fontScale="55000" lnSpcReduction="20000"/>
+          </a:bodyPr>
+          <a:lstStyle/>
+          <a:p>
+            <a:pPr>
+              <a:buFont typeface="Wingdings" panose="05000000000000000000" pitchFamily="2" charset="2"/>
+              <a:buChar char="Ø"/>
+            </a:pPr>
+            <a:r>
+              <a:rPr lang="en-US" altLang="zh-CN" sz="3800" b="1" dirty="0" smtClean="0"/>
+              <a:t>Opportunity Cost:</a:t>
+            </a:r>
+          </a:p>
+          <a:p>
+            <a:pPr marL="0" indent="0">
+              <a:buNone/>
+            </a:pPr>
+            <a:endParaRPr lang="en-US" altLang="zh-CN" sz="3400" dirty="0" smtClean="0"/>
+          </a:p>
+          <a:p>
+            <a:r>
+              <a:rPr lang="en-US" altLang="zh-CN" b="1" dirty="0"/>
+              <a:t>When interest rates are higher call options prices are </a:t>
+            </a:r>
+            <a:r>
+              <a:rPr lang="en-US" altLang="zh-CN" b="1" dirty="0" smtClean="0"/>
+              <a:t>higher</a:t>
+            </a:r>
+          </a:p>
+          <a:p>
+            <a:pPr marL="0" indent="0">
+              <a:buNone/>
+            </a:pPr>
+            <a:r>
+              <a:rPr lang="en-US" altLang="zh-CN" sz="3800" b="1" dirty="0"/>
+              <a:t> </a:t>
+            </a:r>
+            <a:r>
+              <a:rPr lang="en-US" altLang="zh-CN" sz="3800" b="1" dirty="0" smtClean="0"/>
+              <a:t>       </a:t>
+            </a:r>
+            <a:r>
+              <a:rPr lang="en-US" altLang="zh-CN" sz="3800" b="1" dirty="0" smtClean="0">
+                <a:solidFill>
+                  <a:srgbClr val="00B050"/>
+                </a:solidFill>
+              </a:rPr>
+              <a:t>A call option can be looked at as the right to delay a purchase.</a:t>
+            </a:r>
+          </a:p>
+          <a:p>
+            <a:pPr marL="400050" lvl="1" indent="0">
+              <a:buNone/>
+            </a:pPr>
+            <a:r>
+              <a:rPr lang="en-US" altLang="zh-CN" sz="3300" dirty="0" smtClean="0"/>
+              <a:t>when </a:t>
+            </a:r>
+            <a:r>
+              <a:rPr lang="en-US" altLang="zh-CN" sz="3300" dirty="0"/>
+              <a:t>IR (interest </a:t>
+            </a:r>
+            <a:r>
+              <a:rPr lang="en-US" altLang="zh-CN" sz="3300" dirty="0" smtClean="0"/>
+              <a:t>rates) </a:t>
+            </a:r>
+            <a:r>
+              <a:rPr lang="en-US" altLang="zh-CN" sz="3300" dirty="0"/>
+              <a:t>are higher </a:t>
+            </a:r>
+            <a:r>
+              <a:rPr lang="en-US" altLang="zh-CN" sz="3300" b="1" dirty="0"/>
+              <a:t>opportunity costs of holding money is higher</a:t>
+            </a:r>
+            <a:r>
+              <a:rPr lang="en-US" altLang="zh-CN" sz="3300" dirty="0"/>
+              <a:t>. By using call options investors save more money by not paying for the underlying until later date and earn higher interest meanwhile</a:t>
+            </a:r>
+            <a:r>
+              <a:rPr lang="en-US" altLang="zh-CN" sz="3300" dirty="0" smtClean="0"/>
+              <a:t>.</a:t>
+            </a:r>
+          </a:p>
+          <a:p>
+            <a:pPr marL="400050" lvl="1" indent="0">
+              <a:buNone/>
+            </a:pPr>
+            <a:endParaRPr lang="en-US" altLang="zh-CN" sz="2000" dirty="0"/>
+          </a:p>
+          <a:p>
+            <a:r>
+              <a:rPr lang="en-US" altLang="zh-CN" b="1" dirty="0"/>
+              <a:t>When interest rates are higher put options prices are </a:t>
+            </a:r>
+            <a:r>
+              <a:rPr lang="en-US" altLang="zh-CN" b="1" dirty="0" smtClean="0"/>
+              <a:t>lower</a:t>
+            </a:r>
+          </a:p>
+          <a:p>
+            <a:pPr marL="0" indent="0">
+              <a:buNone/>
+            </a:pPr>
+            <a:r>
+              <a:rPr lang="en-US" altLang="zh-CN" sz="3800" b="1" dirty="0">
+                <a:solidFill>
+                  <a:srgbClr val="00B050"/>
+                </a:solidFill>
+              </a:rPr>
+              <a:t>       </a:t>
+            </a:r>
+            <a:r>
+              <a:rPr lang="en-US" altLang="zh-CN" sz="3800" b="1" dirty="0" smtClean="0">
+                <a:solidFill>
+                  <a:srgbClr val="00B050"/>
+                </a:solidFill>
+              </a:rPr>
+              <a:t>A </a:t>
+            </a:r>
+            <a:r>
+              <a:rPr lang="en-US" altLang="zh-CN" sz="3800" b="1" dirty="0">
+                <a:solidFill>
+                  <a:srgbClr val="00B050"/>
+                </a:solidFill>
+              </a:rPr>
+              <a:t>put option can be looked at as the right to delay a sale.</a:t>
+            </a:r>
+          </a:p>
+          <a:p>
+            <a:pPr marL="400050" lvl="1" indent="0">
+              <a:buNone/>
+            </a:pPr>
+            <a:r>
+              <a:rPr lang="en-US" altLang="zh-CN" sz="3300" dirty="0"/>
+              <a:t>when IR are higher opportunity</a:t>
+            </a:r>
+            <a:r>
+              <a:rPr lang="en-US" altLang="zh-CN" sz="3300" b="1" dirty="0"/>
+              <a:t> costs of waiting is higher because investors lose more interest</a:t>
+            </a:r>
+            <a:r>
+              <a:rPr lang="en-US" altLang="zh-CN" sz="3300" dirty="0"/>
+              <a:t> while waiting to sell the underlying when using puts.</a:t>
+            </a:r>
+          </a:p>
+          <a:p>
+            <a:pPr marL="0" indent="0">
+              <a:buNone/>
+            </a:pPr>
+            <a:endParaRPr lang="en-US" altLang="zh-CN" sz="2400" dirty="0" smtClean="0"/>
+          </a:p>
+          <a:p>
+            <a:pPr marL="0" indent="0">
+              <a:buNone/>
+            </a:pPr>
+            <a:endParaRPr lang="en-US" altLang="zh-CN" sz="2400" dirty="0"/>
+          </a:p>
+          <a:p>
+            <a:pPr>
+              <a:buFont typeface="Wingdings" panose="05000000000000000000" pitchFamily="2" charset="2"/>
+              <a:buChar char="Ø"/>
+            </a:pPr>
+            <a:r>
+              <a:rPr lang="en-US" altLang="zh-CN" sz="3800" b="1" dirty="0" smtClean="0"/>
+              <a:t>BSM Formula:  </a:t>
+            </a:r>
+          </a:p>
+          <a:p>
+            <a:pPr marL="0" indent="0">
+              <a:buNone/>
+            </a:pPr>
+            <a:endParaRPr lang="en-US" altLang="zh-CN" sz="2400" dirty="0"/>
+          </a:p>
+          <a:p>
+            <a:pPr marL="0" indent="0">
+              <a:buNone/>
+            </a:pPr>
+            <a:endParaRPr lang="en-US" altLang="zh-CN" sz="2400" dirty="0" smtClean="0"/>
+          </a:p>
+          <a:p>
+            <a:pPr marL="0" indent="0">
+              <a:buNone/>
+            </a:pPr>
+            <a:endParaRPr lang="en-US" altLang="zh-CN" sz="2400" dirty="0"/>
+          </a:p>
+          <a:p>
+            <a:pPr marL="0" indent="0">
+              <a:buNone/>
+            </a:pPr>
+            <a:endParaRPr lang="en-US" altLang="zh-CN" sz="2400" dirty="0" smtClean="0"/>
+          </a:p>
+          <a:p>
+            <a:pPr marL="0" indent="0">
+              <a:buNone/>
+            </a:pPr>
+            <a:endParaRPr lang="en-US" altLang="zh-CN" sz="2400" dirty="0" smtClean="0"/>
+          </a:p>
+          <a:p>
+            <a:pPr marL="0" indent="0">
+              <a:buNone/>
+            </a:pPr>
+            <a:endParaRPr lang="en-US" altLang="zh-CN" sz="2400" b="1" dirty="0" smtClean="0">
+              <a:solidFill>
+                <a:srgbClr val="00B050"/>
+              </a:solidFill>
+            </a:endParaRPr>
+          </a:p>
+          <a:p>
+            <a:pPr marL="0" indent="0">
+              <a:buNone/>
+            </a:pPr>
+            <a:endParaRPr lang="en-US" altLang="zh-CN" sz="2400" b="1" dirty="0" smtClean="0">
+              <a:solidFill>
+                <a:srgbClr val="00B050"/>
+              </a:solidFill>
+            </a:endParaRPr>
+          </a:p>
+        </p:txBody>
+      </p:sp>
+      <p:pic>
+        <p:nvPicPr>
+          <p:cNvPr id="4" name="Picture 2"/>
+          <p:cNvPicPr>
+            <a:picLocks noChangeAspect="1" noChangeArrowheads="1"/>
+          </p:cNvPicPr>
+          <p:nvPr/>
+        </p:nvPicPr>
+        <p:blipFill>
+          <a:blip r:embed="rId3">
+            <a:extLst>
+              <a:ext uri="{28A0092B-C50C-407E-A947-70E740481C1C}">
+                <a14:useLocalDpi xmlns:a14="http://schemas.microsoft.com/office/drawing/2010/main" val="0"/>
+              </a:ext>
+            </a:extLst>
+          </a:blip>
+          <a:srcRect/>
+          <a:stretch>
+            <a:fillRect/>
+          </a:stretch>
+        </p:blipFill>
+        <p:spPr bwMode="auto">
+          <a:xfrm>
+            <a:off x="2627784" y="5713064"/>
+            <a:ext cx="2362200" cy="466725"/>
+          </a:xfrm>
+          <a:prstGeom prst="rect">
+            <a:avLst/>
+          </a:prstGeom>
+          <a:noFill/>
+          <a:ln>
+            <a:noFill/>
+          </a:ln>
+          <a:effectLst/>
+          <a:extLst>
+            <a:ext uri="{909E8E84-426E-40DD-AFC4-6F175D3DCCD1}">
+              <a14:hiddenFill xmlns:a14="http://schemas.microsoft.com/office/drawing/2010/main">
+                <a:solidFill>
+                  <a:schemeClr val="accent1"/>
+                </a:solidFill>
+              </a14:hiddenFill>
+            </a:ext>
+            <a:ext uri="{91240B29-F687-4F45-9708-019B960494DF}">
+              <a14:hiddenLine xmlns:a14="http://schemas.microsoft.com/office/drawing/2010/main" w="9525">
+                <a:solidFill>
+                  <a:schemeClr val="tx1"/>
+                </a:solidFill>
+                <a:miter lim="800000"/>
+                <a:headEnd/>
+                <a:tailEnd/>
+              </a14:hiddenLine>
+            </a:ext>
+            <a:ext uri="{AF507438-7753-43E0-B8FC-AC1667EBCBE1}">
+              <a14:hiddenEffects xmlns:a14="http://schemas.microsoft.com/office/drawing/2010/main">
+                <a:effectLst>
+                  <a:outerShdw dist="35921" dir="2700000" algn="ctr" rotWithShape="0">
+                    <a:schemeClr val="bg2"/>
+                  </a:outerShdw>
+                </a:effectLst>
+              </a14:hiddenEffects>
+            </a:ext>
+          </a:extLst>
+        </p:spPr>
+      </p:pic>
+      <p:pic>
+        <p:nvPicPr>
+          <p:cNvPr id="5" name="Picture 3"/>
+          <p:cNvPicPr>
+            <a:picLocks noChangeAspect="1" noChangeArrowheads="1"/>
+          </p:cNvPicPr>
+          <p:nvPr/>
+        </p:nvPicPr>
+        <p:blipFill>
+          <a:blip r:embed="rId4">
+            <a:extLst>
+              <a:ext uri="{28A0092B-C50C-407E-A947-70E740481C1C}">
+                <a14:useLocalDpi xmlns:a14="http://schemas.microsoft.com/office/drawing/2010/main" val="0"/>
+              </a:ext>
+            </a:extLst>
+          </a:blip>
+          <a:srcRect/>
+          <a:stretch>
+            <a:fillRect/>
+          </a:stretch>
+        </p:blipFill>
+        <p:spPr bwMode="auto">
+          <a:xfrm>
+            <a:off x="6107757" y="5741638"/>
+            <a:ext cx="2352675" cy="409575"/>
+          </a:xfrm>
+          <a:prstGeom prst="rect">
+            <a:avLst/>
+          </a:prstGeom>
+          <a:noFill/>
+          <a:ln>
+            <a:noFill/>
+          </a:ln>
+          <a:effectLst/>
+          <a:extLst>
+            <a:ext uri="{909E8E84-426E-40DD-AFC4-6F175D3DCCD1}">
+              <a14:hiddenFill xmlns:a14="http://schemas.microsoft.com/office/drawing/2010/main">
+                <a:solidFill>
+                  <a:schemeClr val="accent1"/>
+                </a:solidFill>
+              </a14:hiddenFill>
+            </a:ext>
+            <a:ext uri="{91240B29-F687-4F45-9708-019B960494DF}">
+              <a14:hiddenLine xmlns:a14="http://schemas.microsoft.com/office/drawing/2010/main" w="9525">
+                <a:solidFill>
+                  <a:schemeClr val="tx1"/>
+                </a:solidFill>
+                <a:miter lim="800000"/>
+                <a:headEnd/>
+                <a:tailEnd/>
+              </a14:hiddenLine>
+            </a:ext>
+            <a:ext uri="{AF507438-7753-43E0-B8FC-AC1667EBCBE1}">
+              <a14:hiddenEffects xmlns:a14="http://schemas.microsoft.com/office/drawing/2010/main">
+                <a:effectLst>
+                  <a:outerShdw dist="35921" dir="2700000" algn="ctr" rotWithShape="0">
+                    <a:schemeClr val="bg2"/>
+                  </a:outerShdw>
+                </a:effectLst>
+              </a14:hiddenEffects>
+            </a:ext>
+          </a:extLst>
+        </p:spPr>
+      </p:pic>
+      <p:pic>
+        <p:nvPicPr>
+          <p:cNvPr id="1029" name="Picture 5"/>
+          <p:cNvPicPr>
+            <a:picLocks noChangeAspect="1" noChangeArrowheads="1"/>
+          </p:cNvPicPr>
+          <p:nvPr/>
+        </p:nvPicPr>
+        <p:blipFill>
+          <a:blip r:embed="rId5">
+            <a:extLst>
+              <a:ext uri="{28A0092B-C50C-407E-A947-70E740481C1C}">
+                <a14:useLocalDpi xmlns:a14="http://schemas.microsoft.com/office/drawing/2010/main" val="0"/>
+              </a:ext>
+            </a:extLst>
+          </a:blip>
+          <a:srcRect/>
+          <a:stretch>
+            <a:fillRect/>
+          </a:stretch>
+        </p:blipFill>
+        <p:spPr bwMode="auto">
+          <a:xfrm>
+            <a:off x="539552" y="5589240"/>
+            <a:ext cx="1228725" cy="714375"/>
+          </a:xfrm>
+          <a:prstGeom prst="rect">
+            <a:avLst/>
+          </a:prstGeom>
+          <a:noFill/>
+          <a:ln>
+            <a:noFill/>
+          </a:ln>
+          <a:effectLst/>
+          <a:extLst>
+            <a:ext uri="{909E8E84-426E-40DD-AFC4-6F175D3DCCD1}">
+              <a14:hiddenFill xmlns:a14="http://schemas.microsoft.com/office/drawing/2010/main">
+                <a:solidFill>
+                  <a:schemeClr val="accent1"/>
+                </a:solidFill>
+              </a14:hiddenFill>
+            </a:ext>
+            <a:ext uri="{91240B29-F687-4F45-9708-019B960494DF}">
+              <a14:hiddenLine xmlns:a14="http://schemas.microsoft.com/office/drawing/2010/main" w="9525">
+                <a:solidFill>
+                  <a:schemeClr val="tx1"/>
+                </a:solidFill>
+                <a:miter lim="800000"/>
+                <a:headEnd/>
+                <a:tailEnd/>
+              </a14:hiddenLine>
+            </a:ext>
+            <a:ext uri="{AF507438-7753-43E0-B8FC-AC1667EBCBE1}">
+              <a14:hiddenEffects xmlns:a14="http://schemas.microsoft.com/office/drawing/2010/main">
+                <a:effectLst>
+                  <a:outerShdw dist="35921" dir="2700000" algn="ctr" rotWithShape="0">
+                    <a:schemeClr val="bg2"/>
+                  </a:outerShdw>
+                </a:effectLst>
+              </a14:hiddenEffects>
+            </a:ext>
+          </a:extLst>
+        </p:spPr>
+      </p:pic>
+    </p:spTree>
+    <p:extLst>
+      <p:ext uri="{BB962C8B-B14F-4D97-AF65-F5344CB8AC3E}">
+        <p14:creationId xmlns:p14="http://schemas.microsoft.com/office/powerpoint/2010/main" val="1834158343"/>
+      </p:ext>
+    </p:extLst>
+  </p:cSld>
+  <p:clrMapOvr>
+    <a:masterClrMapping/>
+  </p:clrMapOvr>
+  <p:timing>
+    <p:tnLst>
+      <p:par>
+        <p:cTn id="1" dur="indefinite" restart="never" nodeType="tmRoot"/>
+      </p:par>
+    </p:tnLst>
+  </p:timing>
+</p:sld>
+</file>
+
+<file path=ppt/slides/slide8.xml><?xml version="1.0" encoding="utf-8"?>
+<p:sld xmlns:a="http://schemas.openxmlformats.org/drawingml/2006/main" xmlns:r="http://schemas.openxmlformats.org/officeDocument/2006/relationships" xmlns:p="http://schemas.openxmlformats.org/presentationml/2006/main">
+  <p:cSld>
+    <p:spTree>
+      <p:nvGrpSpPr>
+        <p:cNvPr id="1" name=""/>
+        <p:cNvGrpSpPr/>
+        <p:nvPr/>
+      </p:nvGrpSpPr>
+      <p:grpSpPr>
+        <a:xfrm>
+          <a:off x="0" y="0"/>
+          <a:ext cx="0" cy="0"/>
+          <a:chOff x="0" y="0"/>
+          <a:chExt cx="0" cy="0"/>
+        </a:xfrm>
+      </p:grpSpPr>
+      <p:sp>
+        <p:nvSpPr>
+          <p:cNvPr id="2" name="标题 1"/>
+          <p:cNvSpPr>
+            <a:spLocks noGrp="1"/>
+          </p:cNvSpPr>
+          <p:nvPr>
+            <p:ph type="title"/>
+          </p:nvPr>
+        </p:nvSpPr>
+        <p:spPr/>
+        <p:txBody>
+          <a:bodyPr>
+            <a:normAutofit/>
+          </a:bodyPr>
+          <a:lstStyle/>
+          <a:p>
+            <a:pPr algn="l"/>
+            <a:r>
+              <a:rPr lang="en-US" altLang="zh-CN" dirty="0" smtClean="0"/>
               <a:t>Example	</a:t>
             </a:r>
             <a:endParaRPr lang="zh-CN" altLang="en-US" dirty="0"/>
@@ -8442,7 +9242,7 @@
 </p:sld>
 </file>
 
-<file path=ppt/slides/slide8.xml><?xml version="1.0" encoding="utf-8"?>
+<file path=ppt/slides/slide9.xml><?xml version="1.0" encoding="utf-8"?>
 <p:sld xmlns:a="http://schemas.openxmlformats.org/drawingml/2006/main" xmlns:r="http://schemas.openxmlformats.org/officeDocument/2006/relationships" xmlns:p="http://schemas.openxmlformats.org/presentationml/2006/main">
   <p:cSld>
     <p:spTree>
@@ -8783,241 +9583,6 @@
     <p:extLst>
       <p:ext uri="{BB962C8B-B14F-4D97-AF65-F5344CB8AC3E}">
         <p14:creationId xmlns:p14="http://schemas.microsoft.com/office/powerpoint/2010/main" val="2674683178"/>
-      </p:ext>
-    </p:extLst>
-  </p:cSld>
-  <p:clrMapOvr>
-    <a:masterClrMapping/>
-  </p:clrMapOvr>
-  <p:timing>
-    <p:tnLst>
-      <p:par>
-        <p:cTn id="1" dur="indefinite" restart="never" nodeType="tmRoot"/>
-      </p:par>
-    </p:tnLst>
-  </p:timing>
-</p:sld>
-</file>
-
-<file path=ppt/slides/slide9.xml><?xml version="1.0" encoding="utf-8"?>
-<p:sld xmlns:a="http://schemas.openxmlformats.org/drawingml/2006/main" xmlns:r="http://schemas.openxmlformats.org/officeDocument/2006/relationships" xmlns:p="http://schemas.openxmlformats.org/presentationml/2006/main">
-  <p:cSld>
-    <p:spTree>
-      <p:nvGrpSpPr>
-        <p:cNvPr id="1" name=""/>
-        <p:cNvGrpSpPr/>
-        <p:nvPr/>
-      </p:nvGrpSpPr>
-      <p:grpSpPr>
-        <a:xfrm>
-          <a:off x="0" y="0"/>
-          <a:ext cx="0" cy="0"/>
-          <a:chOff x="0" y="0"/>
-          <a:chExt cx="0" cy="0"/>
-        </a:xfrm>
-      </p:grpSpPr>
-      <p:sp>
-        <p:nvSpPr>
-          <p:cNvPr id="2" name="标题 1"/>
-          <p:cNvSpPr>
-            <a:spLocks noGrp="1"/>
-          </p:cNvSpPr>
-          <p:nvPr>
-            <p:ph type="title"/>
-          </p:nvPr>
-        </p:nvSpPr>
-        <p:spPr/>
-        <p:txBody>
-          <a:bodyPr>
-            <a:normAutofit/>
-          </a:bodyPr>
-          <a:lstStyle/>
-          <a:p>
-            <a:pPr algn="l"/>
-            <a:r>
-              <a:rPr lang="en-US" altLang="zh-CN" dirty="0"/>
-              <a:t>Lower &amp; Upper Bound of </a:t>
-            </a:r>
-            <a:r>
-              <a:rPr lang="en-US" altLang="zh-CN" dirty="0" smtClean="0"/>
-              <a:t>Option(2)</a:t>
-            </a:r>
-            <a:endParaRPr lang="en-US" altLang="zh-CN" dirty="0"/>
-          </a:p>
-        </p:txBody>
-      </p:sp>
-      <p:sp>
-        <p:nvSpPr>
-          <p:cNvPr id="3" name="内容占位符 2"/>
-          <p:cNvSpPr>
-            <a:spLocks noGrp="1"/>
-          </p:cNvSpPr>
-          <p:nvPr>
-            <p:ph idx="1"/>
-          </p:nvPr>
-        </p:nvSpPr>
-        <p:spPr>
-          <a:xfrm>
-            <a:off x="95511" y="1474114"/>
-            <a:ext cx="8664946" cy="5267254"/>
-          </a:xfrm>
-        </p:spPr>
-        <p:txBody>
-          <a:bodyPr>
-            <a:normAutofit/>
-          </a:bodyPr>
-          <a:lstStyle/>
-          <a:p>
-            <a:pPr>
-              <a:buFont typeface="Wingdings" panose="05000000000000000000" pitchFamily="2" charset="2"/>
-              <a:buChar char="Ø"/>
-            </a:pPr>
-            <a:r>
-              <a:rPr lang="en-US" altLang="zh-CN" sz="2400" dirty="0" smtClean="0"/>
-              <a:t>Lower &amp; Upper Bound of Option Value</a:t>
-            </a:r>
-          </a:p>
-          <a:p>
-            <a:pPr>
-              <a:buFont typeface="Wingdings" panose="05000000000000000000" pitchFamily="2" charset="2"/>
-              <a:buChar char="Ø"/>
-            </a:pPr>
-            <a:endParaRPr lang="zh-CN" altLang="en-US" sz="2400" dirty="0"/>
-          </a:p>
-        </p:txBody>
-      </p:sp>
-      <p:pic>
-        <p:nvPicPr>
-          <p:cNvPr id="1026" name="Picture 2"/>
-          <p:cNvPicPr>
-            <a:picLocks noChangeAspect="1" noChangeArrowheads="1"/>
-          </p:cNvPicPr>
-          <p:nvPr/>
-        </p:nvPicPr>
-        <p:blipFill>
-          <a:blip r:embed="rId2">
-            <a:extLst>
-              <a:ext uri="{28A0092B-C50C-407E-A947-70E740481C1C}">
-                <a14:useLocalDpi xmlns:a14="http://schemas.microsoft.com/office/drawing/2010/main" val="0"/>
-              </a:ext>
-            </a:extLst>
-          </a:blip>
-          <a:srcRect/>
-          <a:stretch>
-            <a:fillRect/>
-          </a:stretch>
-        </p:blipFill>
-        <p:spPr bwMode="auto">
-          <a:xfrm>
-            <a:off x="395536" y="1160893"/>
-            <a:ext cx="8064896" cy="323891"/>
-          </a:xfrm>
-          <a:prstGeom prst="rect">
-            <a:avLst/>
-          </a:prstGeom>
-          <a:noFill/>
-          <a:ln>
-            <a:noFill/>
-          </a:ln>
-          <a:effectLst/>
-          <a:extLst>
-            <a:ext uri="{909E8E84-426E-40DD-AFC4-6F175D3DCCD1}">
-              <a14:hiddenFill xmlns:a14="http://schemas.microsoft.com/office/drawing/2010/main">
-                <a:solidFill>
-                  <a:schemeClr val="accent1"/>
-                </a:solidFill>
-              </a14:hiddenFill>
-            </a:ext>
-            <a:ext uri="{91240B29-F687-4F45-9708-019B960494DF}">
-              <a14:hiddenLine xmlns:a14="http://schemas.microsoft.com/office/drawing/2010/main" w="9525">
-                <a:solidFill>
-                  <a:schemeClr val="tx1"/>
-                </a:solidFill>
-                <a:miter lim="800000"/>
-                <a:headEnd/>
-                <a:tailEnd/>
-              </a14:hiddenLine>
-            </a:ext>
-            <a:ext uri="{AF507438-7753-43E0-B8FC-AC1667EBCBE1}">
-              <a14:hiddenEffects xmlns:a14="http://schemas.microsoft.com/office/drawing/2010/main">
-                <a:effectLst>
-                  <a:outerShdw dist="35921" dir="2700000" algn="ctr" rotWithShape="0">
-                    <a:schemeClr val="bg2"/>
-                  </a:outerShdw>
-                </a:effectLst>
-              </a14:hiddenEffects>
-            </a:ext>
-          </a:extLst>
-        </p:spPr>
-      </p:pic>
-      <p:pic>
-        <p:nvPicPr>
-          <p:cNvPr id="8" name="Picture 2"/>
-          <p:cNvPicPr>
-            <a:picLocks noChangeAspect="1" noChangeArrowheads="1"/>
-          </p:cNvPicPr>
-          <p:nvPr/>
-        </p:nvPicPr>
-        <p:blipFill>
-          <a:blip r:embed="rId3">
-            <a:extLst>
-              <a:ext uri="{28A0092B-C50C-407E-A947-70E740481C1C}">
-                <a14:useLocalDpi xmlns:a14="http://schemas.microsoft.com/office/drawing/2010/main" val="0"/>
-              </a:ext>
-            </a:extLst>
-          </a:blip>
-          <a:srcRect/>
-          <a:stretch>
-            <a:fillRect/>
-          </a:stretch>
-        </p:blipFill>
-        <p:spPr bwMode="auto">
-          <a:xfrm>
-            <a:off x="464473" y="2708920"/>
-            <a:ext cx="7995959" cy="2376264"/>
-          </a:xfrm>
-          <a:prstGeom prst="rect">
-            <a:avLst/>
-          </a:prstGeom>
-          <a:noFill/>
-          <a:ln>
-            <a:noFill/>
-          </a:ln>
-          <a:effectLst/>
-          <a:extLst>
-            <a:ext uri="{909E8E84-426E-40DD-AFC4-6F175D3DCCD1}">
-              <a14:hiddenFill xmlns:a14="http://schemas.microsoft.com/office/drawing/2010/main">
-                <a:solidFill>
-                  <a:schemeClr val="accent1"/>
-                </a:solidFill>
-              </a14:hiddenFill>
-            </a:ext>
-            <a:ext uri="{91240B29-F687-4F45-9708-019B960494DF}">
-              <a14:hiddenLine xmlns:a14="http://schemas.microsoft.com/office/drawing/2010/main" w="9525">
-                <a:solidFill>
-                  <a:schemeClr val="tx1"/>
-                </a:solidFill>
-                <a:miter lim="800000"/>
-                <a:headEnd/>
-                <a:tailEnd/>
-              </a14:hiddenLine>
-            </a:ext>
-            <a:ext uri="{AF507438-7753-43E0-B8FC-AC1667EBCBE1}">
-              <a14:hiddenEffects xmlns:a14="http://schemas.microsoft.com/office/drawing/2010/main">
-                <a:effectLst>
-                  <a:outerShdw dist="35921" dir="2700000" algn="ctr" rotWithShape="0">
-                    <a:schemeClr val="bg2"/>
-                  </a:outerShdw>
-                </a:effectLst>
-              </a14:hiddenEffects>
-            </a:ext>
-          </a:extLst>
-        </p:spPr>
-      </p:pic>
-    </p:spTree>
-    <p:extLst>
-      <p:ext uri="{BB962C8B-B14F-4D97-AF65-F5344CB8AC3E}">
-        <p14:creationId xmlns:p14="http://schemas.microsoft.com/office/powerpoint/2010/main" val="4095114587"/>
       </p:ext>
     </p:extLst>
   </p:cSld>

</xml_diff>